<commit_message>
add lecture and docker practice
</commit_message>
<xml_diff>
--- a/lectures/NSP_l6. Containerization.Docker.pptx
+++ b/lectures/NSP_l6. Containerization.Docker.pptx
@@ -267,7 +267,7 @@
           </a:bodyPr>
           <a:p>
             <a:pPr algn="r"/>
-            <a:fld id="{BF337244-E695-48AF-BB4A-CEB5AA8B7240}" type="slidenum">
+            <a:fld id="{974B2664-B2C8-4D56-BA06-96B2B09C7503}" type="slidenum">
               <a:rPr b="0" lang="ru-RU" sz="1400" spc="-1" strike="noStrike">
                 <a:latin typeface="Times New Roman"/>
               </a:rPr>
@@ -315,7 +315,7 @@
         <p:spPr>
           <a:xfrm>
             <a:off x="380880" y="685800"/>
-            <a:ext cx="6094440" cy="3427560"/>
+            <a:ext cx="6094080" cy="3427200"/>
           </a:xfrm>
           <a:prstGeom prst="rect">
             <a:avLst/>
@@ -335,7 +335,7 @@
         <p:spPr>
           <a:xfrm>
             <a:off x="685800" y="4343400"/>
-            <a:ext cx="5484960" cy="4113360"/>
+            <a:ext cx="5484600" cy="4113000"/>
           </a:xfrm>
           <a:prstGeom prst="rect">
             <a:avLst/>
@@ -361,7 +361,7 @@
         <p:spPr>
           <a:xfrm>
             <a:off x="3884760" y="8685360"/>
-            <a:ext cx="2970360" cy="455760"/>
+            <a:ext cx="2970000" cy="455400"/>
           </a:xfrm>
           <a:prstGeom prst="rect">
             <a:avLst/>
@@ -387,7 +387,7 @@
                 <a:spcPct val="100000"/>
               </a:lnSpc>
             </a:pPr>
-            <a:fld id="{159F78D2-2BE4-4E52-B10A-8980D25AA9AF}" type="slidenum">
+            <a:fld id="{44FBF4DC-94C9-4455-8D47-8551F5A37775}" type="slidenum">
               <a:rPr b="0" lang="en-US" sz="1200" spc="-1" strike="noStrike">
                 <a:solidFill>
                   <a:srgbClr val="000000"/>
@@ -395,7 +395,7 @@
                 <a:latin typeface="+mn-lt"/>
                 <a:ea typeface="+mn-ea"/>
               </a:rPr>
-              <a:t>27</a:t>
+              <a:t>&lt;номер&gt;</a:t>
             </a:fld>
             <a:endParaRPr b="0" lang="ru-RU" sz="1200" spc="-1" strike="noStrike">
               <a:latin typeface="Arial"/>
@@ -438,7 +438,7 @@
         <p:spPr>
           <a:xfrm>
             <a:off x="380880" y="685800"/>
-            <a:ext cx="6094440" cy="3427560"/>
+            <a:ext cx="6094080" cy="3427200"/>
           </a:xfrm>
           <a:prstGeom prst="rect">
             <a:avLst/>
@@ -458,7 +458,7 @@
         <p:spPr>
           <a:xfrm>
             <a:off x="685800" y="4343400"/>
-            <a:ext cx="5484960" cy="4113360"/>
+            <a:ext cx="5484600" cy="4113000"/>
           </a:xfrm>
           <a:prstGeom prst="rect">
             <a:avLst/>
@@ -484,7 +484,7 @@
         <p:spPr>
           <a:xfrm>
             <a:off x="3884760" y="8685360"/>
-            <a:ext cx="2970360" cy="455760"/>
+            <a:ext cx="2970000" cy="455400"/>
           </a:xfrm>
           <a:prstGeom prst="rect">
             <a:avLst/>
@@ -510,14 +510,14 @@
                 <a:spcPct val="100000"/>
               </a:lnSpc>
             </a:pPr>
-            <a:fld id="{334D62CC-9657-482E-A984-FD90AD73B521}" type="slidenum">
+            <a:fld id="{91863F2F-81E0-4206-BE75-DC5E971F94FB}" type="slidenum">
               <a:rPr b="0" lang="en-US" sz="1200" spc="-1" strike="noStrike">
                 <a:solidFill>
                   <a:srgbClr val="000000"/>
                 </a:solidFill>
                 <a:latin typeface="Times New Roman"/>
               </a:rPr>
-              <a:t>27</a:t>
+              <a:t>&lt;номер&gt;</a:t>
             </a:fld>
             <a:endParaRPr b="0" lang="ru-RU" sz="1200" spc="-1" strike="noStrike">
               <a:latin typeface="Arial"/>
@@ -560,7 +560,7 @@
         <p:spPr>
           <a:xfrm>
             <a:off x="380880" y="685800"/>
-            <a:ext cx="6094440" cy="3427560"/>
+            <a:ext cx="6094080" cy="3427200"/>
           </a:xfrm>
           <a:prstGeom prst="rect">
             <a:avLst/>
@@ -580,7 +580,7 @@
         <p:spPr>
           <a:xfrm>
             <a:off x="685800" y="4343400"/>
-            <a:ext cx="5484960" cy="4113360"/>
+            <a:ext cx="5484600" cy="4113000"/>
           </a:xfrm>
           <a:prstGeom prst="rect">
             <a:avLst/>
@@ -591,7 +591,7 @@
             <a:noAutofit/>
           </a:bodyPr>
           <a:p>
-            <a:pPr marL="216000" indent="-215280">
+            <a:pPr marL="216000" indent="-214920">
               <a:lnSpc>
                 <a:spcPct val="100000"/>
               </a:lnSpc>
@@ -620,7 +620,7 @@
         <p:spPr>
           <a:xfrm>
             <a:off x="3884760" y="8685360"/>
-            <a:ext cx="2970360" cy="455760"/>
+            <a:ext cx="2970000" cy="455400"/>
           </a:xfrm>
           <a:prstGeom prst="rect">
             <a:avLst/>
@@ -646,7 +646,7 @@
                 <a:spcPct val="100000"/>
               </a:lnSpc>
             </a:pPr>
-            <a:fld id="{A8DC926F-78BF-4EA6-93EA-7EF8E9E7B2FA}" type="slidenum">
+            <a:fld id="{EB74FA3C-5275-4E2D-9170-BB4B03681AC3}" type="slidenum">
               <a:rPr b="0" lang="en-US" sz="1200" spc="-1" strike="noStrike">
                 <a:solidFill>
                   <a:srgbClr val="000000"/>
@@ -654,7 +654,7 @@
                 <a:latin typeface="+mn-lt"/>
                 <a:ea typeface="+mn-ea"/>
               </a:rPr>
-              <a:t>27</a:t>
+              <a:t>&lt;номер&gt;</a:t>
             </a:fld>
             <a:endParaRPr b="0" lang="ru-RU" sz="1200" spc="-1" strike="noStrike">
               <a:latin typeface="Arial"/>
@@ -4768,7 +4768,7 @@
         <p:spPr>
           <a:xfrm>
             <a:off x="7421040" y="4899960"/>
-            <a:ext cx="1492200" cy="194400"/>
+            <a:ext cx="1491840" cy="194400"/>
           </a:xfrm>
           <a:prstGeom prst="rect">
             <a:avLst/>
@@ -4794,7 +4794,7 @@
                 <a:spcPct val="100000"/>
               </a:lnSpc>
             </a:pPr>
-            <a:fld id="{8C86C7C6-0B75-4123-8AB4-CB929C18EF84}" type="slidenum">
+            <a:fld id="{9D1F0B89-209E-4A34-B88C-D5CB0B454297}" type="slidenum">
               <a:rPr b="0" lang="en-US" sz="830" spc="-1" strike="noStrike">
                 <a:solidFill>
                   <a:srgbClr val="cccccc"/>
@@ -4823,7 +4823,7 @@
         <p:spPr>
           <a:xfrm>
             <a:off x="283320" y="4933080"/>
-            <a:ext cx="427320" cy="159480"/>
+            <a:ext cx="426960" cy="159120"/>
           </a:xfrm>
           <a:prstGeom prst="rect">
             <a:avLst/>
@@ -5355,7 +5355,7 @@
         <p:spPr>
           <a:xfrm>
             <a:off x="7421040" y="4899960"/>
-            <a:ext cx="1492200" cy="194400"/>
+            <a:ext cx="1491840" cy="194400"/>
           </a:xfrm>
           <a:prstGeom prst="rect">
             <a:avLst/>
@@ -5381,7 +5381,7 @@
                 <a:spcPct val="100000"/>
               </a:lnSpc>
             </a:pPr>
-            <a:fld id="{BEECFB07-3BD1-441C-BDCA-3C52096F0A09}" type="slidenum">
+            <a:fld id="{2E956F91-2C3B-4CFA-BABF-5363F61B16D4}" type="slidenum">
               <a:rPr b="0" lang="en-US" sz="830" spc="-1" strike="noStrike">
                 <a:solidFill>
                   <a:srgbClr val="cccccc"/>
@@ -5410,7 +5410,7 @@
         <p:spPr>
           <a:xfrm>
             <a:off x="283320" y="4933080"/>
-            <a:ext cx="427320" cy="159480"/>
+            <a:ext cx="426960" cy="159120"/>
           </a:xfrm>
           <a:prstGeom prst="rect">
             <a:avLst/>
@@ -5682,7 +5682,7 @@
         <p:spPr>
           <a:xfrm>
             <a:off x="0" y="1130040"/>
-            <a:ext cx="9065160" cy="3368880"/>
+            <a:ext cx="9064800" cy="3368520"/>
           </a:xfrm>
           <a:prstGeom prst="rect">
             <a:avLst/>
@@ -5768,7 +5768,7 @@
 </file>
 
 <file path=ppt/slides/slide10.xml><?xml version="1.0" encoding="utf-8"?>
-<p:sld xmlns:a="http://schemas.openxmlformats.org/drawingml/2006/main" xmlns:p="http://schemas.openxmlformats.org/presentationml/2006/main" xmlns:r="http://schemas.openxmlformats.org/officeDocument/2006/relationships" xmlns:p14="http://schemas.microsoft.com/office/powerpoint/2010/main" xmlns:p15="http://schemas.microsoft.com/office/powerpoint/2012/main" xmlns:mc="http://schemas.openxmlformats.org/markup-compatibility/2006">
+<p:sld xmlns:a="http://schemas.openxmlformats.org/drawingml/2006/main" xmlns:p="http://schemas.openxmlformats.org/presentationml/2006/main" xmlns:r="http://schemas.openxmlformats.org/officeDocument/2006/relationships" xmlns:p14="http://schemas.microsoft.com/office/powerpoint/2010/main" xmlns:p15="http://schemas.microsoft.com/office/powerpoint/2012/main" xmlns:mc="http://schemas.openxmlformats.org/markup-compatibility/2006" show="0">
   <p:cSld>
     <p:spTree>
       <p:nvGrpSpPr>
@@ -5793,7 +5793,7 @@
         <p:spPr>
           <a:xfrm>
             <a:off x="0" y="16920"/>
-            <a:ext cx="9142560" cy="698040"/>
+            <a:ext cx="9142200" cy="697680"/>
           </a:xfrm>
           <a:prstGeom prst="rect">
             <a:avLst/>
@@ -5897,7 +5897,7 @@
         <p:spPr>
           <a:xfrm>
             <a:off x="0" y="4818600"/>
-            <a:ext cx="873360" cy="323640"/>
+            <a:ext cx="873000" cy="323280"/>
           </a:xfrm>
           <a:prstGeom prst="rect">
             <a:avLst/>
@@ -5942,7 +5942,7 @@
         <p:spPr>
           <a:xfrm>
             <a:off x="135360" y="732240"/>
-            <a:ext cx="4138560" cy="4410000"/>
+            <a:ext cx="4138200" cy="4409640"/>
           </a:xfrm>
           <a:prstGeom prst="rect">
             <a:avLst/>
@@ -5965,7 +5965,7 @@
         <p:spPr>
           <a:xfrm>
             <a:off x="4275360" y="732240"/>
-            <a:ext cx="4760280" cy="4006080"/>
+            <a:ext cx="4759920" cy="4005720"/>
           </a:xfrm>
           <a:prstGeom prst="rect">
             <a:avLst/>
@@ -6014,7 +6014,7 @@
         <p:spPr>
           <a:xfrm>
             <a:off x="0" y="16920"/>
-            <a:ext cx="9142560" cy="698040"/>
+            <a:ext cx="9142200" cy="697680"/>
           </a:xfrm>
           <a:prstGeom prst="rect">
             <a:avLst/>
@@ -6122,7 +6122,7 @@
         <p:spPr>
           <a:xfrm>
             <a:off x="621360" y="797760"/>
-            <a:ext cx="7118640" cy="4242240"/>
+            <a:ext cx="7118280" cy="4241880"/>
           </a:xfrm>
           <a:prstGeom prst="rect">
             <a:avLst/>
@@ -6436,7 +6436,7 @@
         <p:spPr>
           <a:xfrm>
             <a:off x="7772040" y="3744000"/>
-            <a:ext cx="1464480" cy="345960"/>
+            <a:ext cx="1464480" cy="345600"/>
           </a:xfrm>
           <a:prstGeom prst="rect">
             <a:avLst/>
@@ -6589,7 +6589,7 @@
         <p:spPr>
           <a:xfrm>
             <a:off x="0" y="4818600"/>
-            <a:ext cx="873360" cy="323640"/>
+            <a:ext cx="873000" cy="323280"/>
           </a:xfrm>
           <a:prstGeom prst="rect">
             <a:avLst/>
@@ -7054,7 +7054,7 @@
         <p:spPr>
           <a:xfrm>
             <a:off x="0" y="16920"/>
-            <a:ext cx="9142560" cy="698040"/>
+            <a:ext cx="9142200" cy="697680"/>
           </a:xfrm>
           <a:prstGeom prst="rect">
             <a:avLst/>
@@ -7162,7 +7162,7 @@
         <p:spPr>
           <a:xfrm>
             <a:off x="4227120" y="740880"/>
-            <a:ext cx="4875840" cy="4059360"/>
+            <a:ext cx="4875480" cy="4059000"/>
           </a:xfrm>
           <a:prstGeom prst="rect">
             <a:avLst/>
@@ -7181,9 +7181,9 @@
         <p:grpSpPr>
           <a:xfrm>
             <a:off x="395640" y="1131480"/>
-            <a:ext cx="5708520" cy="440280"/>
+            <a:ext cx="5708160" cy="440280"/>
             <a:chOff x="395640" y="1131480"/>
-            <a:chExt cx="5708520" cy="440280"/>
+            <a:chExt cx="5708160" cy="440280"/>
           </a:xfrm>
         </p:grpSpPr>
         <p:sp>
@@ -7195,7 +7195,7 @@
           <p:spPr>
             <a:xfrm>
               <a:off x="855000" y="1131480"/>
-              <a:ext cx="5249160" cy="440280"/>
+              <a:ext cx="5248800" cy="440280"/>
             </a:xfrm>
             <a:prstGeom prst="rect">
               <a:avLst/>
@@ -7249,9 +7249,9 @@
           <p:grpSpPr>
             <a:xfrm>
               <a:off x="395640" y="1159560"/>
-              <a:ext cx="347040" cy="377280"/>
+              <a:ext cx="346680" cy="377280"/>
               <a:chOff x="395640" y="1159560"/>
-              <a:chExt cx="347040" cy="377280"/>
+              <a:chExt cx="346680" cy="377280"/>
             </a:xfrm>
           </p:grpSpPr>
           <p:sp>
@@ -7263,7 +7263,7 @@
             <p:spPr>
               <a:xfrm>
                 <a:off x="395640" y="1159560"/>
-                <a:ext cx="347040" cy="347040"/>
+                <a:ext cx="346680" cy="346680"/>
               </a:xfrm>
               <a:prstGeom prst="ellipse">
                 <a:avLst/>
@@ -7304,7 +7304,7 @@
             <p:spPr>
               <a:xfrm>
                 <a:off x="401400" y="1190520"/>
-                <a:ext cx="332280" cy="346320"/>
+                <a:ext cx="331920" cy="346320"/>
               </a:xfrm>
               <a:prstGeom prst="rect">
                 <a:avLst/>
@@ -7357,9 +7357,9 @@
         <p:grpSpPr>
           <a:xfrm>
             <a:off x="392760" y="1698840"/>
-            <a:ext cx="5656680" cy="993960"/>
+            <a:ext cx="5656320" cy="993960"/>
             <a:chOff x="392760" y="1698840"/>
-            <a:chExt cx="5656680" cy="993960"/>
+            <a:chExt cx="5656320" cy="993960"/>
           </a:xfrm>
         </p:grpSpPr>
         <p:sp>
@@ -7371,7 +7371,7 @@
           <p:spPr>
             <a:xfrm>
               <a:off x="852480" y="1698840"/>
-              <a:ext cx="5196960" cy="993960"/>
+              <a:ext cx="5196600" cy="993960"/>
             </a:xfrm>
             <a:prstGeom prst="rect">
               <a:avLst/>
@@ -7444,9 +7444,9 @@
           <p:grpSpPr>
             <a:xfrm>
               <a:off x="392760" y="1719360"/>
-              <a:ext cx="347040" cy="377280"/>
+              <a:ext cx="346680" cy="377280"/>
               <a:chOff x="392760" y="1719360"/>
-              <a:chExt cx="347040" cy="377280"/>
+              <a:chExt cx="346680" cy="377280"/>
             </a:xfrm>
           </p:grpSpPr>
           <p:sp>
@@ -7458,7 +7458,7 @@
             <p:spPr>
               <a:xfrm>
                 <a:off x="392760" y="1719360"/>
-                <a:ext cx="347040" cy="347040"/>
+                <a:ext cx="346680" cy="346680"/>
               </a:xfrm>
               <a:prstGeom prst="ellipse">
                 <a:avLst/>
@@ -7499,7 +7499,7 @@
             <p:spPr>
               <a:xfrm>
                 <a:off x="398880" y="1750320"/>
-                <a:ext cx="332280" cy="346320"/>
+                <a:ext cx="331920" cy="346320"/>
               </a:xfrm>
               <a:prstGeom prst="rect">
                 <a:avLst/>
@@ -7552,9 +7552,9 @@
         <p:grpSpPr>
           <a:xfrm>
             <a:off x="392760" y="2283840"/>
-            <a:ext cx="5656680" cy="440280"/>
+            <a:ext cx="5656320" cy="440280"/>
             <a:chOff x="392760" y="2283840"/>
-            <a:chExt cx="5656680" cy="440280"/>
+            <a:chExt cx="5656320" cy="440280"/>
           </a:xfrm>
         </p:grpSpPr>
         <p:sp>
@@ -7566,7 +7566,7 @@
           <p:spPr>
             <a:xfrm>
               <a:off x="852480" y="2283840"/>
-              <a:ext cx="5196960" cy="440280"/>
+              <a:ext cx="5196600" cy="440280"/>
             </a:xfrm>
             <a:prstGeom prst="rect">
               <a:avLst/>
@@ -7623,9 +7623,9 @@
           <p:grpSpPr>
             <a:xfrm>
               <a:off x="392760" y="2304000"/>
-              <a:ext cx="347040" cy="377640"/>
+              <a:ext cx="346680" cy="377640"/>
               <a:chOff x="392760" y="2304000"/>
-              <a:chExt cx="347040" cy="377640"/>
+              <a:chExt cx="346680" cy="377640"/>
             </a:xfrm>
           </p:grpSpPr>
           <p:sp>
@@ -7637,7 +7637,7 @@
             <p:spPr>
               <a:xfrm>
                 <a:off x="392760" y="2304000"/>
-                <a:ext cx="347040" cy="347040"/>
+                <a:ext cx="346680" cy="346680"/>
               </a:xfrm>
               <a:prstGeom prst="ellipse">
                 <a:avLst/>
@@ -7678,7 +7678,7 @@
             <p:spPr>
               <a:xfrm>
                 <a:off x="398880" y="2335320"/>
-                <a:ext cx="332280" cy="346320"/>
+                <a:ext cx="331920" cy="346320"/>
               </a:xfrm>
               <a:prstGeom prst="rect">
                 <a:avLst/>
@@ -7731,9 +7731,9 @@
         <p:grpSpPr>
           <a:xfrm>
             <a:off x="392760" y="2885400"/>
-            <a:ext cx="5656680" cy="440280"/>
+            <a:ext cx="5656320" cy="440280"/>
             <a:chOff x="392760" y="2885400"/>
-            <a:chExt cx="5656680" cy="440280"/>
+            <a:chExt cx="5656320" cy="440280"/>
           </a:xfrm>
         </p:grpSpPr>
         <p:sp>
@@ -7745,7 +7745,7 @@
           <p:spPr>
             <a:xfrm>
               <a:off x="852480" y="2885400"/>
-              <a:ext cx="5196960" cy="440280"/>
+              <a:ext cx="5196600" cy="440280"/>
             </a:xfrm>
             <a:prstGeom prst="rect">
               <a:avLst/>
@@ -7802,9 +7802,9 @@
           <p:grpSpPr>
             <a:xfrm>
               <a:off x="392760" y="2905920"/>
-              <a:ext cx="347040" cy="377280"/>
+              <a:ext cx="346680" cy="377280"/>
               <a:chOff x="392760" y="2905920"/>
-              <a:chExt cx="347040" cy="377280"/>
+              <a:chExt cx="346680" cy="377280"/>
             </a:xfrm>
           </p:grpSpPr>
           <p:sp>
@@ -7816,7 +7816,7 @@
             <p:spPr>
               <a:xfrm>
                 <a:off x="392760" y="2905920"/>
-                <a:ext cx="347040" cy="347040"/>
+                <a:ext cx="346680" cy="346680"/>
               </a:xfrm>
               <a:prstGeom prst="ellipse">
                 <a:avLst/>
@@ -7857,7 +7857,7 @@
             <p:spPr>
               <a:xfrm>
                 <a:off x="398880" y="2936880"/>
-                <a:ext cx="332280" cy="346320"/>
+                <a:ext cx="331920" cy="346320"/>
               </a:xfrm>
               <a:prstGeom prst="rect">
                 <a:avLst/>
@@ -7910,7 +7910,7 @@
         <p:spPr>
           <a:xfrm>
             <a:off x="0" y="4818600"/>
-            <a:ext cx="873360" cy="323640"/>
+            <a:ext cx="873000" cy="323280"/>
           </a:xfrm>
           <a:prstGeom prst="rect">
             <a:avLst/>
@@ -7981,7 +7981,7 @@
         <p:spPr>
           <a:xfrm>
             <a:off x="0" y="16920"/>
-            <a:ext cx="9142560" cy="698040"/>
+            <a:ext cx="9142200" cy="697680"/>
           </a:xfrm>
           <a:prstGeom prst="rect">
             <a:avLst/>
@@ -8080,7 +8080,7 @@
         <p:spPr>
           <a:xfrm>
             <a:off x="1998360" y="821160"/>
-            <a:ext cx="5188320" cy="4169880"/>
+            <a:ext cx="5187960" cy="4169520"/>
           </a:xfrm>
           <a:prstGeom prst="rect">
             <a:avLst/>
@@ -8099,7 +8099,7 @@
         <p:spPr>
           <a:xfrm>
             <a:off x="0" y="4818600"/>
-            <a:ext cx="873360" cy="323640"/>
+            <a:ext cx="873000" cy="323280"/>
           </a:xfrm>
           <a:prstGeom prst="rect">
             <a:avLst/>
@@ -8170,7 +8170,7 @@
         <p:spPr>
           <a:xfrm>
             <a:off x="0" y="16920"/>
-            <a:ext cx="9142560" cy="698040"/>
+            <a:ext cx="9142200" cy="697680"/>
           </a:xfrm>
           <a:prstGeom prst="rect">
             <a:avLst/>
@@ -8268,7 +8268,7 @@
         <p:spPr>
           <a:xfrm>
             <a:off x="1467720" y="860400"/>
-            <a:ext cx="6206760" cy="3943440"/>
+            <a:ext cx="6206400" cy="3943080"/>
           </a:xfrm>
           <a:prstGeom prst="rect">
             <a:avLst/>
@@ -8287,7 +8287,7 @@
         <p:spPr>
           <a:xfrm>
             <a:off x="0" y="4818600"/>
-            <a:ext cx="873360" cy="323640"/>
+            <a:ext cx="873000" cy="323280"/>
           </a:xfrm>
           <a:prstGeom prst="rect">
             <a:avLst/>
@@ -8358,7 +8358,7 @@
         <p:spPr>
           <a:xfrm>
             <a:off x="0" y="16920"/>
-            <a:ext cx="9142560" cy="698040"/>
+            <a:ext cx="9142200" cy="697680"/>
           </a:xfrm>
           <a:prstGeom prst="rect">
             <a:avLst/>
@@ -8476,7 +8476,7 @@
         <p:spPr>
           <a:xfrm>
             <a:off x="1489320" y="815760"/>
-            <a:ext cx="5530320" cy="4326120"/>
+            <a:ext cx="5529960" cy="4325760"/>
           </a:xfrm>
           <a:prstGeom prst="rect">
             <a:avLst/>
@@ -8495,7 +8495,7 @@
         <p:spPr>
           <a:xfrm>
             <a:off x="0" y="4818600"/>
-            <a:ext cx="873360" cy="323640"/>
+            <a:ext cx="873000" cy="323280"/>
           </a:xfrm>
           <a:prstGeom prst="rect">
             <a:avLst/>
@@ -8541,7 +8541,7 @@
 </file>
 
 <file path=ppt/slides/slide16.xml><?xml version="1.0" encoding="utf-8"?>
-<p:sld xmlns:a="http://schemas.openxmlformats.org/drawingml/2006/main" xmlns:p="http://schemas.openxmlformats.org/presentationml/2006/main" xmlns:r="http://schemas.openxmlformats.org/officeDocument/2006/relationships" xmlns:p14="http://schemas.microsoft.com/office/powerpoint/2010/main" xmlns:p15="http://schemas.microsoft.com/office/powerpoint/2012/main" xmlns:mc="http://schemas.openxmlformats.org/markup-compatibility/2006">
+<p:sld xmlns:a="http://schemas.openxmlformats.org/drawingml/2006/main" xmlns:p="http://schemas.openxmlformats.org/presentationml/2006/main" xmlns:r="http://schemas.openxmlformats.org/officeDocument/2006/relationships" xmlns:p14="http://schemas.microsoft.com/office/powerpoint/2010/main" xmlns:p15="http://schemas.microsoft.com/office/powerpoint/2012/main" xmlns:mc="http://schemas.openxmlformats.org/markup-compatibility/2006" show="0">
   <p:cSld>
     <p:spTree>
       <p:nvGrpSpPr>
@@ -8566,7 +8566,7 @@
         <p:spPr>
           <a:xfrm>
             <a:off x="0" y="16920"/>
-            <a:ext cx="9142560" cy="698040"/>
+            <a:ext cx="9142200" cy="697680"/>
           </a:xfrm>
           <a:prstGeom prst="rect">
             <a:avLst/>
@@ -8664,7 +8664,7 @@
         <p:spPr>
           <a:xfrm>
             <a:off x="277200" y="802800"/>
-            <a:ext cx="8400960" cy="1618200"/>
+            <a:ext cx="8400600" cy="1617840"/>
           </a:xfrm>
           <a:prstGeom prst="rect">
             <a:avLst/>
@@ -8687,7 +8687,7 @@
         <p:spPr>
           <a:xfrm>
             <a:off x="277200" y="2754720"/>
-            <a:ext cx="8400960" cy="1589400"/>
+            <a:ext cx="8400600" cy="1589040"/>
           </a:xfrm>
           <a:prstGeom prst="rect">
             <a:avLst/>
@@ -8706,7 +8706,7 @@
         <p:spPr>
           <a:xfrm>
             <a:off x="0" y="4818600"/>
-            <a:ext cx="873360" cy="323640"/>
+            <a:ext cx="873000" cy="323280"/>
           </a:xfrm>
           <a:prstGeom prst="rect">
             <a:avLst/>
@@ -8752,7 +8752,7 @@
 </file>
 
 <file path=ppt/slides/slide17.xml><?xml version="1.0" encoding="utf-8"?>
-<p:sld xmlns:a="http://schemas.openxmlformats.org/drawingml/2006/main" xmlns:p="http://schemas.openxmlformats.org/presentationml/2006/main" xmlns:r="http://schemas.openxmlformats.org/officeDocument/2006/relationships" xmlns:p14="http://schemas.microsoft.com/office/powerpoint/2010/main" xmlns:p15="http://schemas.microsoft.com/office/powerpoint/2012/main" xmlns:mc="http://schemas.openxmlformats.org/markup-compatibility/2006">
+<p:sld xmlns:a="http://schemas.openxmlformats.org/drawingml/2006/main" xmlns:p="http://schemas.openxmlformats.org/presentationml/2006/main" xmlns:r="http://schemas.openxmlformats.org/officeDocument/2006/relationships" xmlns:p14="http://schemas.microsoft.com/office/powerpoint/2010/main" xmlns:p15="http://schemas.microsoft.com/office/powerpoint/2012/main" xmlns:mc="http://schemas.openxmlformats.org/markup-compatibility/2006" show="0">
   <p:cSld>
     <p:spTree>
       <p:nvGrpSpPr>
@@ -8777,7 +8777,7 @@
         <p:spPr>
           <a:xfrm>
             <a:off x="0" y="16920"/>
-            <a:ext cx="9142560" cy="698040"/>
+            <a:ext cx="9142200" cy="697680"/>
           </a:xfrm>
           <a:prstGeom prst="rect">
             <a:avLst/>
@@ -8875,7 +8875,7 @@
         <p:spPr>
           <a:xfrm>
             <a:off x="366840" y="942120"/>
-            <a:ext cx="8374320" cy="2247480"/>
+            <a:ext cx="8373960" cy="2247120"/>
           </a:xfrm>
           <a:prstGeom prst="rect">
             <a:avLst/>
@@ -8898,7 +8898,7 @@
         <p:spPr>
           <a:xfrm>
             <a:off x="366840" y="3297960"/>
-            <a:ext cx="8362800" cy="579600"/>
+            <a:ext cx="8362440" cy="579240"/>
           </a:xfrm>
           <a:prstGeom prst="rect">
             <a:avLst/>
@@ -8921,7 +8921,7 @@
         <p:spPr>
           <a:xfrm>
             <a:off x="370800" y="3985920"/>
-            <a:ext cx="8400960" cy="522360"/>
+            <a:ext cx="8400600" cy="522000"/>
           </a:xfrm>
           <a:prstGeom prst="rect">
             <a:avLst/>
@@ -8940,7 +8940,7 @@
         <p:spPr>
           <a:xfrm>
             <a:off x="0" y="4818600"/>
-            <a:ext cx="873360" cy="323640"/>
+            <a:ext cx="873000" cy="323280"/>
           </a:xfrm>
           <a:prstGeom prst="rect">
             <a:avLst/>
@@ -9011,7 +9011,7 @@
         <p:spPr>
           <a:xfrm>
             <a:off x="0" y="16920"/>
-            <a:ext cx="9142560" cy="698040"/>
+            <a:ext cx="9142200" cy="697680"/>
           </a:xfrm>
           <a:prstGeom prst="rect">
             <a:avLst/>
@@ -9119,7 +9119,7 @@
         <p:spPr>
           <a:xfrm>
             <a:off x="564120" y="787680"/>
-            <a:ext cx="7741440" cy="4232880"/>
+            <a:ext cx="7741080" cy="4232520"/>
           </a:xfrm>
           <a:prstGeom prst="rect">
             <a:avLst/>
@@ -9138,7 +9138,7 @@
         <p:spPr>
           <a:xfrm>
             <a:off x="0" y="4818600"/>
-            <a:ext cx="873360" cy="323640"/>
+            <a:ext cx="873000" cy="323280"/>
           </a:xfrm>
           <a:prstGeom prst="rect">
             <a:avLst/>
@@ -9209,7 +9209,7 @@
         <p:spPr>
           <a:xfrm>
             <a:off x="0" y="16920"/>
-            <a:ext cx="9142560" cy="698040"/>
+            <a:ext cx="9142200" cy="697680"/>
           </a:xfrm>
           <a:prstGeom prst="rect">
             <a:avLst/>
@@ -9317,7 +9317,7 @@
         <p:spPr>
           <a:xfrm>
             <a:off x="1744200" y="801000"/>
-            <a:ext cx="5401080" cy="4226040"/>
+            <a:ext cx="5400720" cy="4225680"/>
           </a:xfrm>
           <a:prstGeom prst="rect">
             <a:avLst/>
@@ -9336,7 +9336,7 @@
         <p:spPr>
           <a:xfrm>
             <a:off x="0" y="4818600"/>
-            <a:ext cx="873360" cy="323640"/>
+            <a:ext cx="873000" cy="323280"/>
           </a:xfrm>
           <a:prstGeom prst="rect">
             <a:avLst/>
@@ -9407,7 +9407,7 @@
         <p:spPr>
           <a:xfrm>
             <a:off x="360000" y="1080000"/>
-            <a:ext cx="4138920" cy="2518920"/>
+            <a:ext cx="4138560" cy="2518560"/>
           </a:xfrm>
           <a:prstGeom prst="rect">
             <a:avLst/>
@@ -9428,7 +9428,7 @@
             <a:noAutofit/>
           </a:bodyPr>
           <a:p>
-            <a:pPr marL="432000" indent="-322920">
+            <a:pPr marL="432000" indent="-322560">
               <a:lnSpc>
                 <a:spcPct val="150000"/>
               </a:lnSpc>
@@ -9459,7 +9459,7 @@
             </a:endParaRPr>
           </a:p>
           <a:p>
-            <a:pPr marL="432000" indent="-322920">
+            <a:pPr marL="432000" indent="-322560">
               <a:lnSpc>
                 <a:spcPct val="150000"/>
               </a:lnSpc>
@@ -9500,7 +9500,7 @@
             </a:endParaRPr>
           </a:p>
           <a:p>
-            <a:pPr marL="432000" indent="-322920">
+            <a:pPr marL="432000" indent="-322560">
               <a:lnSpc>
                 <a:spcPct val="150000"/>
               </a:lnSpc>
@@ -9551,7 +9551,7 @@
         <p:spPr>
           <a:xfrm>
             <a:off x="422280" y="1342440"/>
-            <a:ext cx="436680" cy="302760"/>
+            <a:ext cx="436320" cy="302760"/>
           </a:xfrm>
           <a:prstGeom prst="rect">
             <a:avLst/>
@@ -9602,7 +9602,7 @@
         <p:spPr>
           <a:xfrm>
             <a:off x="422280" y="3096000"/>
-            <a:ext cx="436680" cy="302760"/>
+            <a:ext cx="436320" cy="302760"/>
           </a:xfrm>
           <a:prstGeom prst="rect">
             <a:avLst/>
@@ -9690,7 +9690,7 @@
         <p:spPr>
           <a:xfrm>
             <a:off x="2999160" y="180000"/>
-            <a:ext cx="2940120" cy="426960"/>
+            <a:ext cx="2939760" cy="426600"/>
           </a:xfrm>
           <a:prstGeom prst="rect">
             <a:avLst/>
@@ -9771,7 +9771,7 @@
         <p:spPr>
           <a:xfrm>
             <a:off x="0" y="16920"/>
-            <a:ext cx="9142560" cy="698040"/>
+            <a:ext cx="9142200" cy="697680"/>
           </a:xfrm>
           <a:prstGeom prst="rect">
             <a:avLst/>
@@ -9869,7 +9869,7 @@
         <p:spPr>
           <a:xfrm>
             <a:off x="551880" y="822240"/>
-            <a:ext cx="7797960" cy="3990600"/>
+            <a:ext cx="7797600" cy="3990240"/>
           </a:xfrm>
           <a:prstGeom prst="rect">
             <a:avLst/>
@@ -9888,7 +9888,7 @@
         <p:spPr>
           <a:xfrm>
             <a:off x="0" y="4818600"/>
-            <a:ext cx="873360" cy="323640"/>
+            <a:ext cx="873000" cy="323280"/>
           </a:xfrm>
           <a:prstGeom prst="rect">
             <a:avLst/>
@@ -9959,7 +9959,7 @@
         <p:spPr>
           <a:xfrm>
             <a:off x="0" y="16920"/>
-            <a:ext cx="9142560" cy="698040"/>
+            <a:ext cx="9142200" cy="697680"/>
           </a:xfrm>
           <a:prstGeom prst="rect">
             <a:avLst/>
@@ -10057,7 +10057,7 @@
         <p:spPr>
           <a:xfrm>
             <a:off x="373320" y="914040"/>
-            <a:ext cx="8410680" cy="3654720"/>
+            <a:ext cx="8410320" cy="3654360"/>
           </a:xfrm>
           <a:prstGeom prst="rect">
             <a:avLst/>
@@ -10076,7 +10076,7 @@
         <p:spPr>
           <a:xfrm>
             <a:off x="0" y="4818600"/>
-            <a:ext cx="873360" cy="323640"/>
+            <a:ext cx="873000" cy="323280"/>
           </a:xfrm>
           <a:prstGeom prst="rect">
             <a:avLst/>
@@ -10147,7 +10147,7 @@
         <p:spPr>
           <a:xfrm>
             <a:off x="0" y="16920"/>
-            <a:ext cx="9142560" cy="698040"/>
+            <a:ext cx="9142200" cy="697680"/>
           </a:xfrm>
           <a:prstGeom prst="rect">
             <a:avLst/>
@@ -10245,7 +10245,7 @@
         <p:spPr>
           <a:xfrm>
             <a:off x="1102320" y="730800"/>
-            <a:ext cx="6949440" cy="4100040"/>
+            <a:ext cx="6949080" cy="4099680"/>
           </a:xfrm>
           <a:prstGeom prst="rect">
             <a:avLst/>
@@ -10264,7 +10264,7 @@
         <p:spPr>
           <a:xfrm>
             <a:off x="0" y="4818600"/>
-            <a:ext cx="873360" cy="323640"/>
+            <a:ext cx="873000" cy="323280"/>
           </a:xfrm>
           <a:prstGeom prst="rect">
             <a:avLst/>
@@ -10335,7 +10335,7 @@
         <p:spPr>
           <a:xfrm>
             <a:off x="0" y="16920"/>
-            <a:ext cx="9142560" cy="698040"/>
+            <a:ext cx="9142200" cy="697680"/>
           </a:xfrm>
           <a:prstGeom prst="rect">
             <a:avLst/>
@@ -10433,7 +10433,7 @@
         <p:spPr>
           <a:xfrm>
             <a:off x="754200" y="935640"/>
-            <a:ext cx="7728120" cy="4064760"/>
+            <a:ext cx="7727760" cy="4064400"/>
           </a:xfrm>
           <a:prstGeom prst="rect">
             <a:avLst/>
@@ -10452,7 +10452,7 @@
         <p:spPr>
           <a:xfrm>
             <a:off x="0" y="4818600"/>
-            <a:ext cx="873360" cy="323640"/>
+            <a:ext cx="873000" cy="323280"/>
           </a:xfrm>
           <a:prstGeom prst="rect">
             <a:avLst/>
@@ -10523,7 +10523,7 @@
         <p:spPr>
           <a:xfrm>
             <a:off x="0" y="16920"/>
-            <a:ext cx="9142560" cy="698040"/>
+            <a:ext cx="9142200" cy="697680"/>
           </a:xfrm>
           <a:prstGeom prst="rect">
             <a:avLst/>
@@ -10641,7 +10641,7 @@
         <p:spPr>
           <a:xfrm>
             <a:off x="5535000" y="1440000"/>
-            <a:ext cx="3285000" cy="2567880"/>
+            <a:ext cx="3284640" cy="2567520"/>
           </a:xfrm>
           <a:prstGeom prst="rect">
             <a:avLst/>
@@ -10660,7 +10660,7 @@
         <p:spPr>
           <a:xfrm>
             <a:off x="0" y="4818600"/>
-            <a:ext cx="873360" cy="323640"/>
+            <a:ext cx="873000" cy="323280"/>
           </a:xfrm>
           <a:prstGeom prst="rect">
             <a:avLst/>
@@ -10694,14 +10694,14 @@
       </p:sp>
       <p:sp>
         <p:nvSpPr>
-          <p:cNvPr id="267" name="TextShape 4"/>
-          <p:cNvSpPr txBox="1"/>
+          <p:cNvPr id="267" name="CustomShape 4"/>
+          <p:cNvSpPr/>
           <p:nvPr/>
         </p:nvSpPr>
         <p:spPr>
           <a:xfrm>
             <a:off x="360000" y="1513800"/>
-            <a:ext cx="5400000" cy="2626200"/>
+            <a:ext cx="5399640" cy="2625840"/>
           </a:xfrm>
           <a:prstGeom prst="rect">
             <a:avLst/>
@@ -10711,12 +10711,18 @@
             <a:noFill/>
           </a:ln>
         </p:spPr>
+        <p:style>
+          <a:lnRef idx="0"/>
+          <a:fillRef idx="0"/>
+          <a:effectRef idx="0"/>
+          <a:fontRef idx="minor"/>
+        </p:style>
         <p:txBody>
           <a:bodyPr lIns="90000" rIns="90000" tIns="45000" bIns="45000">
             <a:noAutofit/>
           </a:bodyPr>
           <a:p>
-            <a:pPr marL="216000" indent="-216000">
+            <a:pPr marL="216000" indent="-215640">
               <a:lnSpc>
                 <a:spcPct val="150000"/>
               </a:lnSpc>
@@ -10741,7 +10747,7 @@
             </a:endParaRPr>
           </a:p>
           <a:p>
-            <a:pPr marL="216000" indent="-216000">
+            <a:pPr marL="216000" indent="-215640">
               <a:lnSpc>
                 <a:spcPct val="150000"/>
               </a:lnSpc>
@@ -10766,7 +10772,7 @@
             </a:endParaRPr>
           </a:p>
           <a:p>
-            <a:pPr marL="216000" indent="-216000">
+            <a:pPr marL="216000" indent="-215640">
               <a:lnSpc>
                 <a:spcPct val="150000"/>
               </a:lnSpc>
@@ -10791,7 +10797,7 @@
             </a:endParaRPr>
           </a:p>
           <a:p>
-            <a:pPr marL="216000" indent="-216000">
+            <a:pPr marL="216000" indent="-215640">
               <a:lnSpc>
                 <a:spcPct val="150000"/>
               </a:lnSpc>
@@ -10856,7 +10862,7 @@
         <p:spPr>
           <a:xfrm>
             <a:off x="0" y="16920"/>
-            <a:ext cx="9142560" cy="698040"/>
+            <a:ext cx="9142200" cy="697680"/>
           </a:xfrm>
           <a:prstGeom prst="rect">
             <a:avLst/>
@@ -10975,7 +10981,7 @@
         <p:spPr>
           <a:xfrm>
             <a:off x="764280" y="849960"/>
-            <a:ext cx="7579080" cy="3664080"/>
+            <a:ext cx="7578720" cy="3663720"/>
           </a:xfrm>
           <a:prstGeom prst="rect">
             <a:avLst/>
@@ -10994,7 +11000,7 @@
         <p:spPr>
           <a:xfrm>
             <a:off x="0" y="4818600"/>
-            <a:ext cx="873360" cy="323640"/>
+            <a:ext cx="873000" cy="323280"/>
           </a:xfrm>
           <a:prstGeom prst="rect">
             <a:avLst/>
@@ -11065,7 +11071,7 @@
         <p:spPr>
           <a:xfrm>
             <a:off x="0" y="16920"/>
-            <a:ext cx="9142560" cy="698040"/>
+            <a:ext cx="9142200" cy="697680"/>
           </a:xfrm>
           <a:prstGeom prst="rect">
             <a:avLst/>
@@ -11173,7 +11179,7 @@
         <p:spPr>
           <a:xfrm>
             <a:off x="5400000" y="1392120"/>
-            <a:ext cx="3285000" cy="2567880"/>
+            <a:ext cx="3284640" cy="2567520"/>
           </a:xfrm>
           <a:prstGeom prst="rect">
             <a:avLst/>
@@ -11192,7 +11198,7 @@
         <p:spPr>
           <a:xfrm>
             <a:off x="0" y="4818600"/>
-            <a:ext cx="873360" cy="323640"/>
+            <a:ext cx="873000" cy="323280"/>
           </a:xfrm>
           <a:prstGeom prst="rect">
             <a:avLst/>
@@ -11226,14 +11232,14 @@
       </p:sp>
       <p:sp>
         <p:nvSpPr>
-          <p:cNvPr id="276" name="TextShape 4"/>
-          <p:cNvSpPr txBox="1"/>
+          <p:cNvPr id="276" name="CustomShape 4"/>
+          <p:cNvSpPr/>
           <p:nvPr/>
         </p:nvSpPr>
         <p:spPr>
           <a:xfrm>
             <a:off x="360000" y="1440000"/>
-            <a:ext cx="5040000" cy="2582280"/>
+            <a:ext cx="5039640" cy="2581920"/>
           </a:xfrm>
           <a:prstGeom prst="rect">
             <a:avLst/>
@@ -11243,12 +11249,18 @@
             <a:noFill/>
           </a:ln>
         </p:spPr>
+        <p:style>
+          <a:lnRef idx="0"/>
+          <a:fillRef idx="0"/>
+          <a:effectRef idx="0"/>
+          <a:fontRef idx="minor"/>
+        </p:style>
         <p:txBody>
           <a:bodyPr lIns="90000" rIns="90000" tIns="45000" bIns="45000">
             <a:noAutofit/>
           </a:bodyPr>
           <a:p>
-            <a:pPr marL="216000" indent="-216000">
+            <a:pPr marL="216000" indent="-215640">
               <a:lnSpc>
                 <a:spcPct val="150000"/>
               </a:lnSpc>
@@ -11273,7 +11285,7 @@
             </a:endParaRPr>
           </a:p>
           <a:p>
-            <a:pPr marL="216000" indent="-216000">
+            <a:pPr marL="216000" indent="-215640">
               <a:lnSpc>
                 <a:spcPct val="150000"/>
               </a:lnSpc>
@@ -11298,7 +11310,7 @@
             </a:endParaRPr>
           </a:p>
           <a:p>
-            <a:pPr marL="216000" indent="-216000">
+            <a:pPr marL="216000" indent="-215640">
               <a:lnSpc>
                 <a:spcPct val="150000"/>
               </a:lnSpc>
@@ -11323,7 +11335,7 @@
             </a:endParaRPr>
           </a:p>
           <a:p>
-            <a:pPr marL="216000" indent="-216000">
+            <a:pPr marL="216000" indent="-215640">
               <a:lnSpc>
                 <a:spcPct val="150000"/>
               </a:lnSpc>
@@ -11388,7 +11400,7 @@
         <p:spPr>
           <a:xfrm>
             <a:off x="0" y="16920"/>
-            <a:ext cx="9142560" cy="698040"/>
+            <a:ext cx="9142200" cy="697680"/>
           </a:xfrm>
           <a:prstGeom prst="rect">
             <a:avLst/>
@@ -11496,7 +11508,7 @@
         <p:spPr>
           <a:xfrm>
             <a:off x="1432440" y="4133880"/>
-            <a:ext cx="6293880" cy="874440"/>
+            <a:ext cx="6293520" cy="874080"/>
           </a:xfrm>
           <a:prstGeom prst="rect">
             <a:avLst/>
@@ -11519,7 +11531,7 @@
         <p:spPr>
           <a:xfrm>
             <a:off x="1441440" y="3390120"/>
-            <a:ext cx="6302520" cy="814320"/>
+            <a:ext cx="6302160" cy="813960"/>
           </a:xfrm>
           <a:prstGeom prst="rect">
             <a:avLst/>
@@ -11542,7 +11554,7 @@
         <p:spPr>
           <a:xfrm>
             <a:off x="1467000" y="2522880"/>
-            <a:ext cx="6225120" cy="866160"/>
+            <a:ext cx="6224760" cy="865800"/>
           </a:xfrm>
           <a:prstGeom prst="rect">
             <a:avLst/>
@@ -11565,7 +11577,7 @@
         <p:spPr>
           <a:xfrm>
             <a:off x="1467000" y="1708560"/>
-            <a:ext cx="6259680" cy="857520"/>
+            <a:ext cx="6259320" cy="857160"/>
           </a:xfrm>
           <a:prstGeom prst="rect">
             <a:avLst/>
@@ -11588,7 +11600,7 @@
         <p:spPr>
           <a:xfrm>
             <a:off x="1449720" y="885960"/>
-            <a:ext cx="6259680" cy="762840"/>
+            <a:ext cx="6259320" cy="762480"/>
           </a:xfrm>
           <a:prstGeom prst="rect">
             <a:avLst/>
@@ -11607,7 +11619,7 @@
         <p:spPr>
           <a:xfrm>
             <a:off x="0" y="4818600"/>
-            <a:ext cx="873360" cy="323640"/>
+            <a:ext cx="873000" cy="323280"/>
           </a:xfrm>
           <a:prstGeom prst="rect">
             <a:avLst/>
@@ -12163,7 +12175,7 @@
         <p:spPr>
           <a:xfrm>
             <a:off x="0" y="16920"/>
-            <a:ext cx="9142560" cy="698040"/>
+            <a:ext cx="9142200" cy="697680"/>
           </a:xfrm>
           <a:prstGeom prst="rect">
             <a:avLst/>
@@ -12257,7 +12269,7 @@
         <p:spPr>
           <a:xfrm>
             <a:off x="286920" y="804240"/>
-            <a:ext cx="4547880" cy="573480"/>
+            <a:ext cx="4547520" cy="573120"/>
           </a:xfrm>
           <a:prstGeom prst="rect">
             <a:avLst/>
@@ -12307,9 +12319,6 @@
               <a:t>:</a:t>
             </a:r>
             <a:endParaRPr b="0" lang="ru-RU" sz="2000" spc="-1" strike="noStrike">
-              <a:solidFill>
-                <a:srgbClr val="000000"/>
-              </a:solidFill>
               <a:latin typeface="Arial"/>
             </a:endParaRPr>
           </a:p>
@@ -12328,7 +12337,7 @@
         <p:spPr>
           <a:xfrm>
             <a:off x="5000400" y="765360"/>
-            <a:ext cx="3962520" cy="4065840"/>
+            <a:ext cx="3962160" cy="4065480"/>
           </a:xfrm>
           <a:prstGeom prst="rect">
             <a:avLst/>
@@ -12347,7 +12356,7 @@
         <p:spPr>
           <a:xfrm>
             <a:off x="0" y="4818600"/>
-            <a:ext cx="873360" cy="323640"/>
+            <a:ext cx="873000" cy="323280"/>
           </a:xfrm>
           <a:prstGeom prst="rect">
             <a:avLst/>
@@ -12381,14 +12390,14 @@
       </p:sp>
       <p:sp>
         <p:nvSpPr>
-          <p:cNvPr id="135" name="TextShape 5"/>
-          <p:cNvSpPr txBox="1"/>
+          <p:cNvPr id="135" name="CustomShape 5"/>
+          <p:cNvSpPr/>
           <p:nvPr/>
         </p:nvSpPr>
         <p:spPr>
           <a:xfrm>
             <a:off x="360000" y="1377720"/>
-            <a:ext cx="4500000" cy="2582280"/>
+            <a:ext cx="4499640" cy="2581920"/>
           </a:xfrm>
           <a:prstGeom prst="rect">
             <a:avLst/>
@@ -12398,12 +12407,18 @@
             <a:noFill/>
           </a:ln>
         </p:spPr>
+        <p:style>
+          <a:lnRef idx="0"/>
+          <a:fillRef idx="0"/>
+          <a:effectRef idx="0"/>
+          <a:fontRef idx="minor"/>
+        </p:style>
         <p:txBody>
           <a:bodyPr lIns="90000" rIns="90000" tIns="45000" bIns="45000">
             <a:noAutofit/>
           </a:bodyPr>
           <a:p>
-            <a:pPr marL="216000" indent="-216000">
+            <a:pPr marL="216000" indent="-215640">
               <a:lnSpc>
                 <a:spcPct val="150000"/>
               </a:lnSpc>
@@ -12428,7 +12443,7 @@
             </a:endParaRPr>
           </a:p>
           <a:p>
-            <a:pPr marL="216000" indent="-216000">
+            <a:pPr marL="216000" indent="-215640">
               <a:lnSpc>
                 <a:spcPct val="150000"/>
               </a:lnSpc>
@@ -12453,7 +12468,7 @@
             </a:endParaRPr>
           </a:p>
           <a:p>
-            <a:pPr marL="216000" indent="-216000">
+            <a:pPr marL="216000" indent="-215640">
               <a:lnSpc>
                 <a:spcPct val="150000"/>
               </a:lnSpc>
@@ -12478,7 +12493,7 @@
             </a:endParaRPr>
           </a:p>
           <a:p>
-            <a:pPr marL="216000" indent="-216000">
+            <a:pPr marL="216000" indent="-215640">
               <a:lnSpc>
                 <a:spcPct val="150000"/>
               </a:lnSpc>
@@ -12503,7 +12518,7 @@
             </a:endParaRPr>
           </a:p>
           <a:p>
-            <a:pPr marL="216000" indent="-216000">
+            <a:pPr marL="216000" indent="-215640">
               <a:lnSpc>
                 <a:spcPct val="150000"/>
               </a:lnSpc>
@@ -12572,7 +12587,7 @@
         <p:spPr>
           <a:xfrm>
             <a:off x="732600" y="117360"/>
-            <a:ext cx="8018280" cy="4967640"/>
+            <a:ext cx="8017920" cy="4967280"/>
           </a:xfrm>
           <a:prstGeom prst="rect">
             <a:avLst/>
@@ -12591,7 +12606,7 @@
         <p:spPr>
           <a:xfrm flipH="1">
             <a:off x="4455360" y="3722040"/>
-            <a:ext cx="2711160" cy="127440"/>
+            <a:ext cx="2710800" cy="127080"/>
           </a:xfrm>
           <a:custGeom>
             <a:avLst/>
@@ -12634,7 +12649,7 @@
         <p:spPr>
           <a:xfrm>
             <a:off x="7192440" y="3547080"/>
-            <a:ext cx="1545480" cy="418680"/>
+            <a:ext cx="1545120" cy="418680"/>
           </a:xfrm>
           <a:prstGeom prst="rect">
             <a:avLst/>
@@ -12685,7 +12700,7 @@
         <p:spPr>
           <a:xfrm>
             <a:off x="4243320" y="3740400"/>
-            <a:ext cx="212040" cy="219600"/>
+            <a:ext cx="211680" cy="219240"/>
           </a:xfrm>
           <a:prstGeom prst="flowChartConnector">
             <a:avLst/>
@@ -12729,7 +12744,7 @@
         <p:spPr>
           <a:xfrm>
             <a:off x="4742640" y="2296440"/>
-            <a:ext cx="212040" cy="219600"/>
+            <a:ext cx="211680" cy="219240"/>
           </a:xfrm>
           <a:prstGeom prst="flowChartConnector">
             <a:avLst/>
@@ -12773,7 +12788,7 @@
         <p:spPr>
           <a:xfrm>
             <a:off x="2400480" y="1596240"/>
-            <a:ext cx="2340720" cy="744480"/>
+            <a:ext cx="2340360" cy="744120"/>
           </a:xfrm>
           <a:custGeom>
             <a:avLst/>
@@ -12816,7 +12831,7 @@
         <p:spPr>
           <a:xfrm>
             <a:off x="1109520" y="1163880"/>
-            <a:ext cx="1832040" cy="418680"/>
+            <a:ext cx="1831680" cy="418680"/>
           </a:xfrm>
           <a:prstGeom prst="rect">
             <a:avLst/>
@@ -12867,7 +12882,7 @@
         <p:spPr>
           <a:xfrm>
             <a:off x="4272120" y="2601720"/>
-            <a:ext cx="212040" cy="219600"/>
+            <a:ext cx="211680" cy="219240"/>
           </a:xfrm>
           <a:prstGeom prst="flowChartConnector">
             <a:avLst/>
@@ -12911,7 +12926,7 @@
         <p:spPr>
           <a:xfrm>
             <a:off x="0" y="4818600"/>
-            <a:ext cx="873360" cy="323640"/>
+            <a:ext cx="873000" cy="323280"/>
           </a:xfrm>
           <a:prstGeom prst="rect">
             <a:avLst/>
@@ -13258,7 +13273,7 @@
         <p:spPr>
           <a:xfrm>
             <a:off x="0" y="16920"/>
-            <a:ext cx="9142560" cy="698040"/>
+            <a:ext cx="9142200" cy="697680"/>
           </a:xfrm>
           <a:prstGeom prst="rect">
             <a:avLst/>
@@ -13356,7 +13371,7 @@
         <p:spPr>
           <a:xfrm>
             <a:off x="0" y="716400"/>
-            <a:ext cx="5386680" cy="4285080"/>
+            <a:ext cx="5386320" cy="4284720"/>
           </a:xfrm>
           <a:prstGeom prst="rect">
             <a:avLst/>
@@ -13375,7 +13390,7 @@
         <p:spPr>
           <a:xfrm>
             <a:off x="0" y="4818600"/>
-            <a:ext cx="873360" cy="323640"/>
+            <a:ext cx="873000" cy="323280"/>
           </a:xfrm>
           <a:prstGeom prst="rect">
             <a:avLst/>
@@ -13420,7 +13435,7 @@
         <p:spPr>
           <a:xfrm>
             <a:off x="5475600" y="716400"/>
-            <a:ext cx="3511440" cy="4372200"/>
+            <a:ext cx="3511080" cy="4371840"/>
           </a:xfrm>
           <a:prstGeom prst="rect">
             <a:avLst/>
@@ -13469,7 +13484,7 @@
         <p:spPr>
           <a:xfrm>
             <a:off x="0" y="16920"/>
-            <a:ext cx="9142560" cy="698040"/>
+            <a:ext cx="9142200" cy="697680"/>
           </a:xfrm>
           <a:prstGeom prst="rect">
             <a:avLst/>
@@ -13567,7 +13582,7 @@
         <p:spPr>
           <a:xfrm>
             <a:off x="4291920" y="798120"/>
-            <a:ext cx="4671000" cy="3932280"/>
+            <a:ext cx="4670640" cy="3931920"/>
           </a:xfrm>
           <a:prstGeom prst="rect">
             <a:avLst/>
@@ -13586,7 +13601,7 @@
         <p:spPr>
           <a:xfrm>
             <a:off x="0" y="4818600"/>
-            <a:ext cx="873360" cy="323640"/>
+            <a:ext cx="873000" cy="323280"/>
           </a:xfrm>
           <a:prstGeom prst="rect">
             <a:avLst/>
@@ -13620,14 +13635,14 @@
       </p:sp>
       <p:sp>
         <p:nvSpPr>
-          <p:cNvPr id="154" name="TextShape 4"/>
-          <p:cNvSpPr txBox="1"/>
+          <p:cNvPr id="154" name="CustomShape 4"/>
+          <p:cNvSpPr/>
           <p:nvPr/>
         </p:nvSpPr>
         <p:spPr>
           <a:xfrm>
             <a:off x="360000" y="1080000"/>
-            <a:ext cx="3931920" cy="2582280"/>
+            <a:ext cx="3931560" cy="2581920"/>
           </a:xfrm>
           <a:prstGeom prst="rect">
             <a:avLst/>
@@ -13637,12 +13652,18 @@
             <a:noFill/>
           </a:ln>
         </p:spPr>
+        <p:style>
+          <a:lnRef idx="0"/>
+          <a:fillRef idx="0"/>
+          <a:effectRef idx="0"/>
+          <a:fontRef idx="minor"/>
+        </p:style>
         <p:txBody>
           <a:bodyPr lIns="90000" rIns="90000" tIns="45000" bIns="45000">
             <a:noAutofit/>
           </a:bodyPr>
           <a:p>
-            <a:pPr marL="216000" indent="-216000">
+            <a:pPr marL="216000" indent="-215640">
               <a:lnSpc>
                 <a:spcPct val="150000"/>
               </a:lnSpc>
@@ -13667,7 +13688,7 @@
             </a:endParaRPr>
           </a:p>
           <a:p>
-            <a:pPr marL="216000" indent="-216000">
+            <a:pPr marL="216000" indent="-215640">
               <a:lnSpc>
                 <a:spcPct val="150000"/>
               </a:lnSpc>
@@ -13692,7 +13713,7 @@
             </a:endParaRPr>
           </a:p>
           <a:p>
-            <a:pPr marL="216000" indent="-216000">
+            <a:pPr marL="216000" indent="-215640">
               <a:lnSpc>
                 <a:spcPct val="150000"/>
               </a:lnSpc>
@@ -13717,7 +13738,7 @@
             </a:endParaRPr>
           </a:p>
           <a:p>
-            <a:pPr marL="216000" indent="-216000">
+            <a:pPr marL="216000" indent="-215640">
               <a:lnSpc>
                 <a:spcPct val="150000"/>
               </a:lnSpc>
@@ -13782,7 +13803,7 @@
         <p:spPr>
           <a:xfrm>
             <a:off x="0" y="16920"/>
-            <a:ext cx="9142560" cy="698040"/>
+            <a:ext cx="9142200" cy="697680"/>
           </a:xfrm>
           <a:prstGeom prst="rect">
             <a:avLst/>
@@ -13880,7 +13901,7 @@
         <p:spPr>
           <a:xfrm>
             <a:off x="251640" y="915480"/>
-            <a:ext cx="4019040" cy="3603240"/>
+            <a:ext cx="4018680" cy="3602880"/>
           </a:xfrm>
           <a:prstGeom prst="rect">
             <a:avLst/>
@@ -13903,7 +13924,7 @@
         <p:spPr>
           <a:xfrm>
             <a:off x="4950360" y="915480"/>
-            <a:ext cx="4009680" cy="3603240"/>
+            <a:ext cx="4009320" cy="3602880"/>
           </a:xfrm>
           <a:prstGeom prst="rect">
             <a:avLst/>
@@ -13922,7 +13943,7 @@
         <p:spPr>
           <a:xfrm>
             <a:off x="0" y="4818600"/>
-            <a:ext cx="873360" cy="323640"/>
+            <a:ext cx="873000" cy="323280"/>
           </a:xfrm>
           <a:prstGeom prst="rect">
             <a:avLst/>
@@ -13993,7 +14014,7 @@
         <p:spPr>
           <a:xfrm>
             <a:off x="0" y="16920"/>
-            <a:ext cx="9142560" cy="698040"/>
+            <a:ext cx="9142200" cy="697680"/>
           </a:xfrm>
           <a:prstGeom prst="rect">
             <a:avLst/>
@@ -14091,7 +14112,7 @@
         <p:spPr>
           <a:xfrm>
             <a:off x="379440" y="1009080"/>
-            <a:ext cx="2417760" cy="1017720"/>
+            <a:ext cx="2417400" cy="1017360"/>
           </a:xfrm>
           <a:prstGeom prst="rect">
             <a:avLst/>
@@ -14110,7 +14131,7 @@
         <p:spPr>
           <a:xfrm>
             <a:off x="3208680" y="784440"/>
-            <a:ext cx="4891320" cy="1549440"/>
+            <a:ext cx="4890960" cy="1549440"/>
           </a:xfrm>
           <a:prstGeom prst="rect">
             <a:avLst/>
@@ -14131,7 +14152,7 @@
             <a:spAutoFit/>
           </a:bodyPr>
           <a:p>
-            <a:pPr marL="216000" indent="-216000">
+            <a:pPr marL="216000" indent="-215640">
               <a:lnSpc>
                 <a:spcPct val="120000"/>
               </a:lnSpc>
@@ -14139,7 +14160,7 @@
                 <a:srgbClr val="000000"/>
               </a:buClr>
               <a:buSzPct val="45000"/>
-              <a:buFont typeface="Symbol" charset="2"/>
+              <a:buFont typeface="Symbol"/>
               <a:buChar char=""/>
             </a:pPr>
             <a:r>
@@ -14157,7 +14178,7 @@
             </a:endParaRPr>
           </a:p>
           <a:p>
-            <a:pPr marL="216000" indent="-216000">
+            <a:pPr marL="216000" indent="-215640">
               <a:lnSpc>
                 <a:spcPct val="120000"/>
               </a:lnSpc>
@@ -14165,7 +14186,7 @@
                 <a:srgbClr val="000000"/>
               </a:buClr>
               <a:buSzPct val="45000"/>
-              <a:buFont typeface="Symbol" charset="2"/>
+              <a:buFont typeface="Symbol"/>
               <a:buChar char=""/>
             </a:pPr>
             <a:r>
@@ -14183,7 +14204,7 @@
             </a:endParaRPr>
           </a:p>
           <a:p>
-            <a:pPr marL="216000" indent="-216000">
+            <a:pPr marL="216000" indent="-215640">
               <a:lnSpc>
                 <a:spcPct val="120000"/>
               </a:lnSpc>
@@ -14191,7 +14212,7 @@
                 <a:srgbClr val="000000"/>
               </a:buClr>
               <a:buSzPct val="45000"/>
-              <a:buFont typeface="Symbol" charset="2"/>
+              <a:buFont typeface="Symbol"/>
               <a:buChar char=""/>
             </a:pPr>
             <a:r>
@@ -14209,7 +14230,7 @@
             </a:endParaRPr>
           </a:p>
           <a:p>
-            <a:pPr marL="216000" indent="-216000">
+            <a:pPr marL="216000" indent="-215640">
               <a:lnSpc>
                 <a:spcPct val="120000"/>
               </a:lnSpc>
@@ -14217,7 +14238,7 @@
                 <a:srgbClr val="000000"/>
               </a:buClr>
               <a:buSzPct val="45000"/>
-              <a:buFont typeface="Symbol" charset="2"/>
+              <a:buFont typeface="Symbol"/>
               <a:buChar char=""/>
             </a:pPr>
             <a:r>
@@ -14235,7 +14256,7 @@
             </a:endParaRPr>
           </a:p>
           <a:p>
-            <a:pPr marL="216000" indent="-216000">
+            <a:pPr marL="216000" indent="-215640">
               <a:lnSpc>
                 <a:spcPct val="120000"/>
               </a:lnSpc>
@@ -14243,7 +14264,7 @@
                 <a:srgbClr val="000000"/>
               </a:buClr>
               <a:buSzPct val="45000"/>
-              <a:buFont typeface="Symbol" charset="2"/>
+              <a:buFont typeface="Symbol"/>
               <a:buChar char=""/>
             </a:pPr>
             <a:r>
@@ -14275,7 +14296,7 @@
         <p:spPr>
           <a:xfrm>
             <a:off x="449640" y="2320560"/>
-            <a:ext cx="2490120" cy="1126800"/>
+            <a:ext cx="2489760" cy="1126440"/>
           </a:xfrm>
           <a:prstGeom prst="rect">
             <a:avLst/>
@@ -14294,7 +14315,7 @@
         <p:spPr>
           <a:xfrm>
             <a:off x="3240000" y="2503080"/>
-            <a:ext cx="3886200" cy="916920"/>
+            <a:ext cx="3885840" cy="916920"/>
           </a:xfrm>
           <a:prstGeom prst="rect">
             <a:avLst/>
@@ -14315,7 +14336,7 @@
             <a:spAutoFit/>
           </a:bodyPr>
           <a:p>
-            <a:pPr marL="216000" indent="-216000">
+            <a:pPr marL="216000" indent="-215640">
               <a:lnSpc>
                 <a:spcPct val="120000"/>
               </a:lnSpc>
@@ -14323,7 +14344,7 @@
                 <a:srgbClr val="000000"/>
               </a:buClr>
               <a:buSzPct val="45000"/>
-              <a:buFont typeface="Symbol" charset="2"/>
+              <a:buFont typeface="Symbol"/>
               <a:buChar char=""/>
             </a:pPr>
             <a:r>
@@ -14341,7 +14362,7 @@
             </a:endParaRPr>
           </a:p>
           <a:p>
-            <a:pPr marL="216000" indent="-216000">
+            <a:pPr marL="216000" indent="-215640">
               <a:lnSpc>
                 <a:spcPct val="120000"/>
               </a:lnSpc>
@@ -14349,7 +14370,7 @@
                 <a:srgbClr val="000000"/>
               </a:buClr>
               <a:buSzPct val="45000"/>
-              <a:buFont typeface="Symbol" charset="2"/>
+              <a:buFont typeface="Symbol"/>
               <a:buChar char=""/>
             </a:pPr>
             <a:r>
@@ -14367,7 +14388,7 @@
             </a:endParaRPr>
           </a:p>
           <a:p>
-            <a:pPr marL="216000" indent="-216000">
+            <a:pPr marL="216000" indent="-215640">
               <a:lnSpc>
                 <a:spcPct val="100000"/>
               </a:lnSpc>
@@ -14375,7 +14396,7 @@
                 <a:srgbClr val="000000"/>
               </a:buClr>
               <a:buSzPct val="45000"/>
-              <a:buFont typeface="Symbol" charset="2"/>
+              <a:buFont typeface="Symbol"/>
               <a:buChar char=""/>
             </a:pPr>
             <a:r>
@@ -14407,7 +14428,7 @@
         <p:spPr>
           <a:xfrm>
             <a:off x="449640" y="3552840"/>
-            <a:ext cx="1390320" cy="1390320"/>
+            <a:ext cx="1389960" cy="1389960"/>
           </a:xfrm>
           <a:prstGeom prst="rect">
             <a:avLst/>
@@ -14447,7 +14468,7 @@
             <a:spAutoFit/>
           </a:bodyPr>
           <a:p>
-            <a:pPr lvl="1" marL="432000" indent="-216000">
+            <a:pPr lvl="1" marL="432000" indent="-215640">
               <a:lnSpc>
                 <a:spcPct val="100000"/>
               </a:lnSpc>
@@ -14455,7 +14476,7 @@
                 <a:srgbClr val="000000"/>
               </a:buClr>
               <a:buSzPct val="45000"/>
-              <a:buFont typeface="Symbol" charset="2"/>
+              <a:buFont typeface="Symbol"/>
               <a:buChar char=""/>
             </a:pPr>
             <a:r>
@@ -14473,7 +14494,7 @@
             </a:endParaRPr>
           </a:p>
           <a:p>
-            <a:pPr lvl="1" marL="432000" indent="-216000">
+            <a:pPr lvl="1" marL="432000" indent="-215640">
               <a:lnSpc>
                 <a:spcPct val="100000"/>
               </a:lnSpc>
@@ -14481,7 +14502,7 @@
                 <a:srgbClr val="000000"/>
               </a:buClr>
               <a:buSzPct val="45000"/>
-              <a:buFont typeface="Symbol" charset="2"/>
+              <a:buFont typeface="Symbol"/>
               <a:buChar char=""/>
             </a:pPr>
             <a:r>
@@ -14509,7 +14530,7 @@
         <p:spPr>
           <a:xfrm>
             <a:off x="0" y="4818600"/>
-            <a:ext cx="873360" cy="323640"/>
+            <a:ext cx="873000" cy="323280"/>
           </a:xfrm>
           <a:prstGeom prst="rect">
             <a:avLst/>
@@ -14580,7 +14601,7 @@
         <p:spPr>
           <a:xfrm>
             <a:off x="0" y="16920"/>
-            <a:ext cx="9142560" cy="698040"/>
+            <a:ext cx="9142200" cy="697680"/>
           </a:xfrm>
           <a:prstGeom prst="rect">
             <a:avLst/>
@@ -14688,7 +14709,7 @@
         <p:spPr>
           <a:xfrm>
             <a:off x="62280" y="716400"/>
-            <a:ext cx="8970480" cy="3923640"/>
+            <a:ext cx="8970120" cy="3923280"/>
           </a:xfrm>
           <a:prstGeom prst="rect">
             <a:avLst/>
@@ -14707,7 +14728,7 @@
         <p:spPr>
           <a:xfrm>
             <a:off x="418680" y="4005720"/>
-            <a:ext cx="4126320" cy="819720"/>
+            <a:ext cx="4125960" cy="819720"/>
           </a:xfrm>
           <a:prstGeom prst="rect">
             <a:avLst/>
@@ -14768,7 +14789,7 @@
         <p:spPr>
           <a:xfrm>
             <a:off x="4917240" y="4014720"/>
-            <a:ext cx="4115160" cy="1063080"/>
+            <a:ext cx="4114800" cy="1063080"/>
           </a:xfrm>
           <a:prstGeom prst="rect">
             <a:avLst/>
@@ -14829,7 +14850,7 @@
         <p:spPr>
           <a:xfrm>
             <a:off x="0" y="4818600"/>
-            <a:ext cx="873360" cy="323640"/>
+            <a:ext cx="873000" cy="323280"/>
           </a:xfrm>
           <a:prstGeom prst="rect">
             <a:avLst/>

</xml_diff>